<commit_message>
Update presentation - PostgreSQL + Backend connected
</commit_message>
<xml_diff>
--- a/CivicEye-Presentation.pptx
+++ b/CivicEye-Presentation.pptx
@@ -5680,7 +5680,7 @@
                 <a:ea typeface="Calibri" pitchFamily="34" charset="-122"/>
                 <a:cs typeface="Calibri" pitchFamily="34" charset="-120"/>
               </a:rPr>
-              <a:t>Mobile verification</a:t>
+              <a:t>Backend API auth</a:t>
             </a:r>
             <a:endParaRPr lang="en-US" sz="900" dirty="0"/>
           </a:p>
@@ -5697,7 +5697,7 @@
                 <a:ea typeface="Calibri" pitchFamily="34" charset="-122"/>
                 <a:cs typeface="Calibri" pitchFamily="34" charset="-120"/>
               </a:rPr>
-              <a:t>Secure accounts</a:t>
+              <a:t>Kisi bhi device se</a:t>
             </a:r>
             <a:endParaRPr lang="en-US" sz="900" dirty="0"/>
           </a:p>
@@ -6608,13 +6608,13 @@
           </a:solidFill>
           <a:ln w="16510">
             <a:solidFill>
-              <a:srgbClr val="25D366"/>
+              <a:srgbClr val="00FF88"/>
             </a:solidFill>
             <a:prstDash val="solid"/>
           </a:ln>
           <a:effectLst>
             <a:outerShdw sx="100000" sy="100000" kx="0" ky="0" algn="bl" rotWithShape="0" blurRad="279400" dist="50800" dir="16200000">
-              <a:srgbClr val="25D366">
+              <a:srgbClr val="00FF88">
                 <a:alpha val="25000"/>
               </a:srgbClr>
             </a:outerShdw>
@@ -6638,7 +6638,7 @@
             </a:avLst>
           </a:prstGeom>
           <a:solidFill>
-            <a:srgbClr val="25D366">
+            <a:srgbClr val="00FF88">
               <a:alpha val="18000"/>
             </a:srgbClr>
           </a:solidFill>
@@ -6665,7 +6665,7 @@
             <a:avLst/>
           </a:prstGeom>
           <a:solidFill>
-            <a:srgbClr val="25D366">
+            <a:srgbClr val="00FF88">
               <a:alpha val="18000"/>
             </a:srgbClr>
           </a:solidFill>
@@ -6707,7 +6707,7 @@
                   <a:srgbClr val="000000"/>
                 </a:solidFill>
               </a:rPr>
-              <a:t>📲</a:t>
+              <a:t>🗄</a:t>
             </a:r>
             <a:endParaRPr lang="en-US" sz="2600" dirty="0"/>
           </a:p>
@@ -6740,13 +6740,13 @@
             <a:r>
               <a:rPr lang="en-US" sz="1150" b="1" dirty="0">
                 <a:solidFill>
-                  <a:srgbClr val="25D366"/>
+                  <a:srgbClr val="00FF88"/>
                 </a:solidFill>
                 <a:latin typeface="Calibri" pitchFamily="34" charset="0"/>
                 <a:ea typeface="Calibri" pitchFamily="34" charset="-122"/>
                 <a:cs typeface="Calibri" pitchFamily="34" charset="-120"/>
               </a:rPr>
-              <a:t>WhatsApp Alerts</a:t>
+              <a:t>PostgreSQL DB</a:t>
             </a:r>
             <a:endParaRPr lang="en-US" sz="1150" dirty="0"/>
           </a:p>
@@ -6785,7 +6785,7 @@
                 <a:ea typeface="Calibri" pitchFamily="34" charset="-122"/>
                 <a:cs typeface="Calibri" pitchFamily="34" charset="-120"/>
               </a:rPr>
-              <a:t>Instant notify</a:t>
+              <a:t>Permanent storage</a:t>
             </a:r>
             <a:endParaRPr lang="en-US" sz="900" dirty="0"/>
           </a:p>
@@ -6802,7 +6802,7 @@
                 <a:ea typeface="Calibri" pitchFamily="34" charset="-122"/>
                 <a:cs typeface="Calibri" pitchFamily="34" charset="-120"/>
               </a:rPr>
-              <a:t>File · Assign · Resolve</a:t>
+              <a:t>All data saved ✅</a:t>
             </a:r>
             <a:endParaRPr lang="en-US" sz="900" dirty="0"/>
           </a:p>
@@ -10348,7 +10348,7 @@
                 <a:ea typeface="Calibri" pitchFamily="34" charset="-122"/>
                 <a:cs typeface="Calibri" pitchFamily="34" charset="-120"/>
               </a:rPr>
-              <a:t>React 18  ·  Vite 7  ·  Pure CSS-in-JS  ·  No external UI library</a:t>
+              <a:t>React 18  ·  Vite 7  ·  Pure CSS-in-JS  ·  Backend API Connected ✅</a:t>
             </a:r>
             <a:endParaRPr lang="en-US" sz="920" dirty="0"/>
           </a:p>
@@ -10756,7 +10756,7 @@
                 <a:ea typeface="Calibri" pitchFamily="34" charset="-122"/>
                 <a:cs typeface="Calibri" pitchFamily="34" charset="-120"/>
               </a:rPr>
-              <a:t>FastAPI (Python)  ·  SQLite dev  ·  PostgreSQL prod ready  ·  REST API</a:t>
+              <a:t>FastAPI (Python)  ·  PostgreSQL Production DB  ·  REST API  ·  Live ✅</a:t>
             </a:r>
             <a:endParaRPr lang="en-US" sz="920" dirty="0"/>
           </a:p>
@@ -10771,6 +10771,210 @@
         <p:spPr>
           <a:xfrm>
             <a:off x="4736592" y="1956816"/>
+            <a:ext cx="4297680" cy="822960"/>
+          </a:xfrm>
+          <a:prstGeom prst="roundRect">
+            <a:avLst>
+              <a:gd name="adj" fmla="val 7778"/>
+            </a:avLst>
+          </a:prstGeom>
+          <a:solidFill>
+            <a:srgbClr val="112030"/>
+          </a:solidFill>
+          <a:ln w="12700">
+            <a:solidFill>
+              <a:srgbClr val="00FF88"/>
+            </a:solidFill>
+            <a:prstDash val="solid"/>
+          </a:ln>
+          <a:effectLst>
+            <a:outerShdw sx="100000" sy="100000" kx="0" ky="0" algn="bl" rotWithShape="0" blurRad="279400" dist="50800" dir="16200000">
+              <a:srgbClr val="00FF88">
+                <a:alpha val="15000"/>
+              </a:srgbClr>
+            </a:outerShdw>
+          </a:effectLst>
+        </p:spPr>
+      </p:sp>
+      <p:sp>
+        <p:nvSpPr>
+          <p:cNvPr id="26" name="Shape 24"/>
+          <p:cNvSpPr/>
+          <p:nvPr/>
+        </p:nvSpPr>
+        <p:spPr>
+          <a:xfrm>
+            <a:off x="4736592" y="1956816"/>
+            <a:ext cx="713232" cy="822960"/>
+          </a:xfrm>
+          <a:prstGeom prst="roundRect">
+            <a:avLst>
+              <a:gd name="adj" fmla="val 8974"/>
+            </a:avLst>
+          </a:prstGeom>
+          <a:solidFill>
+            <a:srgbClr val="00FF88">
+              <a:alpha val="18000"/>
+            </a:srgbClr>
+          </a:solidFill>
+          <a:ln w="12700">
+            <a:solidFill>
+              <a:srgbClr val="000000"/>
+            </a:solidFill>
+            <a:prstDash val="solid"/>
+          </a:ln>
+        </p:spPr>
+      </p:sp>
+      <p:sp>
+        <p:nvSpPr>
+          <p:cNvPr id="27" name="Shape 25"/>
+          <p:cNvSpPr/>
+          <p:nvPr/>
+        </p:nvSpPr>
+        <p:spPr>
+          <a:xfrm>
+            <a:off x="5175504" y="1956816"/>
+            <a:ext cx="274320" cy="822960"/>
+          </a:xfrm>
+          <a:prstGeom prst="rect">
+            <a:avLst/>
+          </a:prstGeom>
+          <a:solidFill>
+            <a:srgbClr val="00FF88">
+              <a:alpha val="18000"/>
+            </a:srgbClr>
+          </a:solidFill>
+          <a:ln w="12700">
+            <a:solidFill>
+              <a:srgbClr val="000000"/>
+            </a:solidFill>
+            <a:prstDash val="solid"/>
+          </a:ln>
+        </p:spPr>
+      </p:sp>
+      <p:sp>
+        <p:nvSpPr>
+          <p:cNvPr id="28" name="Text 26"/>
+          <p:cNvSpPr/>
+          <p:nvPr/>
+        </p:nvSpPr>
+        <p:spPr>
+          <a:xfrm>
+            <a:off x="4736592" y="1956816"/>
+            <a:ext cx="713232" cy="822960"/>
+          </a:xfrm>
+          <a:prstGeom prst="rect">
+            <a:avLst/>
+          </a:prstGeom>
+          <a:noFill/>
+          <a:ln/>
+        </p:spPr>
+        <p:txBody>
+          <a:bodyPr wrap="square" lIns="0" tIns="0" rIns="0" bIns="0" rtlCol="0" anchor="ctr"/>
+          <a:lstStyle/>
+          <a:p>
+            <a:pPr algn="ctr" indent="0" marL="0">
+              <a:buNone/>
+            </a:pPr>
+            <a:r>
+              <a:rPr lang="en-US" sz="2200" dirty="0">
+                <a:solidFill>
+                  <a:srgbClr val="000000"/>
+                </a:solidFill>
+              </a:rPr>
+              <a:t>🗄</a:t>
+            </a:r>
+            <a:endParaRPr lang="en-US" sz="2200" dirty="0"/>
+          </a:p>
+        </p:txBody>
+      </p:sp>
+      <p:sp>
+        <p:nvSpPr>
+          <p:cNvPr id="29" name="Text 27"/>
+          <p:cNvSpPr/>
+          <p:nvPr/>
+        </p:nvSpPr>
+        <p:spPr>
+          <a:xfrm>
+            <a:off x="5541264" y="2029968"/>
+            <a:ext cx="1371600" cy="237744"/>
+          </a:xfrm>
+          <a:prstGeom prst="rect">
+            <a:avLst/>
+          </a:prstGeom>
+          <a:noFill/>
+          <a:ln/>
+        </p:spPr>
+        <p:txBody>
+          <a:bodyPr wrap="square" lIns="0" tIns="0" rIns="0" bIns="0" rtlCol="0" anchor="ctr"/>
+          <a:lstStyle/>
+          <a:p>
+            <a:pPr indent="0" marL="0">
+              <a:buNone/>
+            </a:pPr>
+            <a:r>
+              <a:rPr lang="en-US" sz="900" b="1" spc="100" kern="0" dirty="0">
+                <a:solidFill>
+                  <a:srgbClr val="00FF88"/>
+                </a:solidFill>
+                <a:latin typeface="Consolas" pitchFamily="34" charset="0"/>
+                <a:ea typeface="Consolas" pitchFamily="34" charset="-122"/>
+                <a:cs typeface="Consolas" pitchFamily="34" charset="-120"/>
+              </a:rPr>
+              <a:t>DATABASE</a:t>
+            </a:r>
+            <a:endParaRPr lang="en-US" sz="900" dirty="0"/>
+          </a:p>
+        </p:txBody>
+      </p:sp>
+      <p:sp>
+        <p:nvSpPr>
+          <p:cNvPr id="30" name="Text 28"/>
+          <p:cNvSpPr/>
+          <p:nvPr/>
+        </p:nvSpPr>
+        <p:spPr>
+          <a:xfrm>
+            <a:off x="5541264" y="2286000"/>
+            <a:ext cx="3401568" cy="420624"/>
+          </a:xfrm>
+          <a:prstGeom prst="rect">
+            <a:avLst/>
+          </a:prstGeom>
+          <a:noFill/>
+          <a:ln/>
+        </p:spPr>
+        <p:txBody>
+          <a:bodyPr wrap="square" lIns="0" tIns="0" rIns="0" bIns="0" rtlCol="0" anchor="ctr"/>
+          <a:lstStyle/>
+          <a:p>
+            <a:pPr indent="0" marL="0">
+              <a:buNone/>
+            </a:pPr>
+            <a:r>
+              <a:rPr lang="en-US" sz="920" dirty="0">
+                <a:solidFill>
+                  <a:srgbClr val="3D6080"/>
+                </a:solidFill>
+                <a:latin typeface="Calibri" pitchFamily="34" charset="0"/>
+                <a:ea typeface="Calibri" pitchFamily="34" charset="-122"/>
+                <a:cs typeface="Calibri" pitchFamily="34" charset="-120"/>
+              </a:rPr>
+              <a:t>PostgreSQL on Render  ·  Permanent storage  ·  All users &amp; complaints saved ✅</a:t>
+            </a:r>
+            <a:endParaRPr lang="en-US" sz="920" dirty="0"/>
+          </a:p>
+        </p:txBody>
+      </p:sp>
+      <p:sp>
+        <p:nvSpPr>
+          <p:cNvPr id="31" name="Shape 29"/>
+          <p:cNvSpPr/>
+          <p:nvPr/>
+        </p:nvSpPr>
+        <p:spPr>
+          <a:xfrm>
+            <a:off x="274320" y="2926080"/>
             <a:ext cx="4297680" cy="822960"/>
           </a:xfrm>
           <a:prstGeom prst="roundRect">
@@ -10798,13 +11002,13 @@
       </p:sp>
       <p:sp>
         <p:nvSpPr>
-          <p:cNvPr id="26" name="Shape 24"/>
-          <p:cNvSpPr/>
-          <p:nvPr/>
-        </p:nvSpPr>
-        <p:spPr>
-          <a:xfrm>
-            <a:off x="4736592" y="1956816"/>
+          <p:cNvPr id="32" name="Shape 30"/>
+          <p:cNvSpPr/>
+          <p:nvPr/>
+        </p:nvSpPr>
+        <p:spPr>
+          <a:xfrm>
+            <a:off x="274320" y="2926080"/>
             <a:ext cx="713232" cy="822960"/>
           </a:xfrm>
           <a:prstGeom prst="roundRect">
@@ -10827,13 +11031,13 @@
       </p:sp>
       <p:sp>
         <p:nvSpPr>
-          <p:cNvPr id="27" name="Shape 25"/>
-          <p:cNvSpPr/>
-          <p:nvPr/>
-        </p:nvSpPr>
-        <p:spPr>
-          <a:xfrm>
-            <a:off x="5175504" y="1956816"/>
+          <p:cNvPr id="33" name="Shape 31"/>
+          <p:cNvSpPr/>
+          <p:nvPr/>
+        </p:nvSpPr>
+        <p:spPr>
+          <a:xfrm>
+            <a:off x="713232" y="2926080"/>
             <a:ext cx="274320" cy="822960"/>
           </a:xfrm>
           <a:prstGeom prst="rect">
@@ -10854,13 +11058,13 @@
       </p:sp>
       <p:sp>
         <p:nvSpPr>
-          <p:cNvPr id="28" name="Text 26"/>
-          <p:cNvSpPr/>
-          <p:nvPr/>
-        </p:nvSpPr>
-        <p:spPr>
-          <a:xfrm>
-            <a:off x="4736592" y="1956816"/>
+          <p:cNvPr id="34" name="Text 32"/>
+          <p:cNvSpPr/>
+          <p:nvPr/>
+        </p:nvSpPr>
+        <p:spPr>
+          <a:xfrm>
+            <a:off x="274320" y="2926080"/>
             <a:ext cx="713232" cy="822960"/>
           </a:xfrm>
           <a:prstGeom prst="rect">
@@ -10890,13 +11094,13 @@
       </p:sp>
       <p:sp>
         <p:nvSpPr>
-          <p:cNvPr id="29" name="Text 27"/>
-          <p:cNvSpPr/>
-          <p:nvPr/>
-        </p:nvSpPr>
-        <p:spPr>
-          <a:xfrm>
-            <a:off x="5541264" y="2029968"/>
+          <p:cNvPr id="35" name="Text 33"/>
+          <p:cNvSpPr/>
+          <p:nvPr/>
+        </p:nvSpPr>
+        <p:spPr>
+          <a:xfrm>
+            <a:off x="1078992" y="2999232"/>
             <a:ext cx="1371600" cy="237744"/>
           </a:xfrm>
           <a:prstGeom prst="rect">
@@ -10929,13 +11133,13 @@
       </p:sp>
       <p:sp>
         <p:nvSpPr>
-          <p:cNvPr id="30" name="Text 28"/>
-          <p:cNvSpPr/>
-          <p:nvPr/>
-        </p:nvSpPr>
-        <p:spPr>
-          <a:xfrm>
-            <a:off x="5541264" y="2286000"/>
+          <p:cNvPr id="36" name="Text 34"/>
+          <p:cNvSpPr/>
+          <p:nvPr/>
+        </p:nvSpPr>
+        <p:spPr>
+          <a:xfrm>
+            <a:off x="1078992" y="3255264"/>
             <a:ext cx="3401568" cy="420624"/>
           </a:xfrm>
           <a:prstGeom prst="rect">
@@ -10968,13 +11172,13 @@
       </p:sp>
       <p:sp>
         <p:nvSpPr>
-          <p:cNvPr id="31" name="Shape 29"/>
-          <p:cNvSpPr/>
-          <p:nvPr/>
-        </p:nvSpPr>
-        <p:spPr>
-          <a:xfrm>
-            <a:off x="274320" y="2926080"/>
+          <p:cNvPr id="37" name="Shape 35"/>
+          <p:cNvSpPr/>
+          <p:nvPr/>
+        </p:nvSpPr>
+        <p:spPr>
+          <a:xfrm>
+            <a:off x="4736592" y="2926080"/>
             <a:ext cx="4297680" cy="822960"/>
           </a:xfrm>
           <a:prstGeom prst="roundRect">
@@ -11002,13 +11206,13 @@
       </p:sp>
       <p:sp>
         <p:nvSpPr>
-          <p:cNvPr id="32" name="Shape 30"/>
-          <p:cNvSpPr/>
-          <p:nvPr/>
-        </p:nvSpPr>
-        <p:spPr>
-          <a:xfrm>
-            <a:off x="274320" y="2926080"/>
+          <p:cNvPr id="38" name="Shape 36"/>
+          <p:cNvSpPr/>
+          <p:nvPr/>
+        </p:nvSpPr>
+        <p:spPr>
+          <a:xfrm>
+            <a:off x="4736592" y="2926080"/>
             <a:ext cx="713232" cy="822960"/>
           </a:xfrm>
           <a:prstGeom prst="roundRect">
@@ -11031,13 +11235,13 @@
       </p:sp>
       <p:sp>
         <p:nvSpPr>
-          <p:cNvPr id="33" name="Shape 31"/>
-          <p:cNvSpPr/>
-          <p:nvPr/>
-        </p:nvSpPr>
-        <p:spPr>
-          <a:xfrm>
-            <a:off x="713232" y="2926080"/>
+          <p:cNvPr id="39" name="Shape 37"/>
+          <p:cNvSpPr/>
+          <p:nvPr/>
+        </p:nvSpPr>
+        <p:spPr>
+          <a:xfrm>
+            <a:off x="5175504" y="2926080"/>
             <a:ext cx="274320" cy="822960"/>
           </a:xfrm>
           <a:prstGeom prst="rect">
@@ -11058,13 +11262,13 @@
       </p:sp>
       <p:sp>
         <p:nvSpPr>
-          <p:cNvPr id="34" name="Text 32"/>
-          <p:cNvSpPr/>
-          <p:nvPr/>
-        </p:nvSpPr>
-        <p:spPr>
-          <a:xfrm>
-            <a:off x="274320" y="2926080"/>
+          <p:cNvPr id="40" name="Text 38"/>
+          <p:cNvSpPr/>
+          <p:nvPr/>
+        </p:nvSpPr>
+        <p:spPr>
+          <a:xfrm>
+            <a:off x="4736592" y="2926080"/>
             <a:ext cx="713232" cy="822960"/>
           </a:xfrm>
           <a:prstGeom prst="rect">
@@ -11094,13 +11298,13 @@
       </p:sp>
       <p:sp>
         <p:nvSpPr>
-          <p:cNvPr id="35" name="Text 33"/>
-          <p:cNvSpPr/>
-          <p:nvPr/>
-        </p:nvSpPr>
-        <p:spPr>
-          <a:xfrm>
-            <a:off x="1078992" y="2999232"/>
+          <p:cNvPr id="41" name="Text 39"/>
+          <p:cNvSpPr/>
+          <p:nvPr/>
+        </p:nvSpPr>
+        <p:spPr>
+          <a:xfrm>
+            <a:off x="5541264" y="2999232"/>
             <a:ext cx="1371600" cy="237744"/>
           </a:xfrm>
           <a:prstGeom prst="rect">
@@ -11133,13 +11337,13 @@
       </p:sp>
       <p:sp>
         <p:nvSpPr>
-          <p:cNvPr id="36" name="Text 34"/>
-          <p:cNvSpPr/>
-          <p:nvPr/>
-        </p:nvSpPr>
-        <p:spPr>
-          <a:xfrm>
-            <a:off x="1078992" y="3255264"/>
+          <p:cNvPr id="42" name="Text 40"/>
+          <p:cNvSpPr/>
+          <p:nvPr/>
+        </p:nvSpPr>
+        <p:spPr>
+          <a:xfrm>
+            <a:off x="5541264" y="3255264"/>
             <a:ext cx="3401568" cy="420624"/>
           </a:xfrm>
           <a:prstGeom prst="rect">
@@ -11172,13 +11376,13 @@
       </p:sp>
       <p:sp>
         <p:nvSpPr>
-          <p:cNvPr id="37" name="Shape 35"/>
-          <p:cNvSpPr/>
-          <p:nvPr/>
-        </p:nvSpPr>
-        <p:spPr>
-          <a:xfrm>
-            <a:off x="4736592" y="2926080"/>
+          <p:cNvPr id="43" name="Shape 41"/>
+          <p:cNvSpPr/>
+          <p:nvPr/>
+        </p:nvSpPr>
+        <p:spPr>
+          <a:xfrm>
+            <a:off x="274320" y="3895344"/>
             <a:ext cx="4297680" cy="822960"/>
           </a:xfrm>
           <a:prstGeom prst="roundRect">
@@ -11206,13 +11410,13 @@
       </p:sp>
       <p:sp>
         <p:nvSpPr>
-          <p:cNvPr id="38" name="Shape 36"/>
-          <p:cNvSpPr/>
-          <p:nvPr/>
-        </p:nvSpPr>
-        <p:spPr>
-          <a:xfrm>
-            <a:off x="4736592" y="2926080"/>
+          <p:cNvPr id="44" name="Shape 42"/>
+          <p:cNvSpPr/>
+          <p:nvPr/>
+        </p:nvSpPr>
+        <p:spPr>
+          <a:xfrm>
+            <a:off x="274320" y="3895344"/>
             <a:ext cx="713232" cy="822960"/>
           </a:xfrm>
           <a:prstGeom prst="roundRect">
@@ -11235,13 +11439,13 @@
       </p:sp>
       <p:sp>
         <p:nvSpPr>
-          <p:cNvPr id="39" name="Shape 37"/>
-          <p:cNvSpPr/>
-          <p:nvPr/>
-        </p:nvSpPr>
-        <p:spPr>
-          <a:xfrm>
-            <a:off x="5175504" y="2926080"/>
+          <p:cNvPr id="45" name="Shape 43"/>
+          <p:cNvSpPr/>
+          <p:nvPr/>
+        </p:nvSpPr>
+        <p:spPr>
+          <a:xfrm>
+            <a:off x="713232" y="3895344"/>
             <a:ext cx="274320" cy="822960"/>
           </a:xfrm>
           <a:prstGeom prst="rect">
@@ -11262,13 +11466,13 @@
       </p:sp>
       <p:sp>
         <p:nvSpPr>
-          <p:cNvPr id="40" name="Text 38"/>
-          <p:cNvSpPr/>
-          <p:nvPr/>
-        </p:nvSpPr>
-        <p:spPr>
-          <a:xfrm>
-            <a:off x="4736592" y="2926080"/>
+          <p:cNvPr id="46" name="Text 44"/>
+          <p:cNvSpPr/>
+          <p:nvPr/>
+        </p:nvSpPr>
+        <p:spPr>
+          <a:xfrm>
+            <a:off x="274320" y="3895344"/>
             <a:ext cx="713232" cy="822960"/>
           </a:xfrm>
           <a:prstGeom prst="rect">
@@ -11298,13 +11502,13 @@
       </p:sp>
       <p:sp>
         <p:nvSpPr>
-          <p:cNvPr id="41" name="Text 39"/>
-          <p:cNvSpPr/>
-          <p:nvPr/>
-        </p:nvSpPr>
-        <p:spPr>
-          <a:xfrm>
-            <a:off x="5541264" y="2999232"/>
+          <p:cNvPr id="47" name="Text 45"/>
+          <p:cNvSpPr/>
+          <p:nvPr/>
+        </p:nvSpPr>
+        <p:spPr>
+          <a:xfrm>
+            <a:off x="1078992" y="3968496"/>
             <a:ext cx="1371600" cy="237744"/>
           </a:xfrm>
           <a:prstGeom prst="rect">
@@ -11337,13 +11541,13 @@
       </p:sp>
       <p:sp>
         <p:nvSpPr>
-          <p:cNvPr id="42" name="Text 40"/>
-          <p:cNvSpPr/>
-          <p:nvPr/>
-        </p:nvSpPr>
-        <p:spPr>
-          <a:xfrm>
-            <a:off x="5541264" y="3255264"/>
+          <p:cNvPr id="48" name="Text 46"/>
+          <p:cNvSpPr/>
+          <p:nvPr/>
+        </p:nvSpPr>
+        <p:spPr>
+          <a:xfrm>
+            <a:off x="1078992" y="4224528"/>
             <a:ext cx="3401568" cy="420624"/>
           </a:xfrm>
           <a:prstGeom prst="rect">
@@ -11368,211 +11572,7 @@
                 <a:ea typeface="Calibri" pitchFamily="34" charset="-122"/>
                 <a:cs typeface="Calibri" pitchFamily="34" charset="-120"/>
               </a:rPr>
-              <a:t>Mobile OTP Engine  ·  Session management  ·  Role-based access control</a:t>
-            </a:r>
-            <a:endParaRPr lang="en-US" sz="920" dirty="0"/>
-          </a:p>
-        </p:txBody>
-      </p:sp>
-      <p:sp>
-        <p:nvSpPr>
-          <p:cNvPr id="43" name="Shape 41"/>
-          <p:cNvSpPr/>
-          <p:nvPr/>
-        </p:nvSpPr>
-        <p:spPr>
-          <a:xfrm>
-            <a:off x="274320" y="3895344"/>
-            <a:ext cx="4297680" cy="822960"/>
-          </a:xfrm>
-          <a:prstGeom prst="roundRect">
-            <a:avLst>
-              <a:gd name="adj" fmla="val 7778"/>
-            </a:avLst>
-          </a:prstGeom>
-          <a:solidFill>
-            <a:srgbClr val="112030"/>
-          </a:solidFill>
-          <a:ln w="12700">
-            <a:solidFill>
-              <a:srgbClr val="00FFD1"/>
-            </a:solidFill>
-            <a:prstDash val="solid"/>
-          </a:ln>
-          <a:effectLst>
-            <a:outerShdw sx="100000" sy="100000" kx="0" ky="0" algn="bl" rotWithShape="0" blurRad="279400" dist="50800" dir="16200000">
-              <a:srgbClr val="00FFD1">
-                <a:alpha val="15000"/>
-              </a:srgbClr>
-            </a:outerShdw>
-          </a:effectLst>
-        </p:spPr>
-      </p:sp>
-      <p:sp>
-        <p:nvSpPr>
-          <p:cNvPr id="44" name="Shape 42"/>
-          <p:cNvSpPr/>
-          <p:nvPr/>
-        </p:nvSpPr>
-        <p:spPr>
-          <a:xfrm>
-            <a:off x="274320" y="3895344"/>
-            <a:ext cx="713232" cy="822960"/>
-          </a:xfrm>
-          <a:prstGeom prst="roundRect">
-            <a:avLst>
-              <a:gd name="adj" fmla="val 8974"/>
-            </a:avLst>
-          </a:prstGeom>
-          <a:solidFill>
-            <a:srgbClr val="00FFD1">
-              <a:alpha val="18000"/>
-            </a:srgbClr>
-          </a:solidFill>
-          <a:ln w="12700">
-            <a:solidFill>
-              <a:srgbClr val="000000"/>
-            </a:solidFill>
-            <a:prstDash val="solid"/>
-          </a:ln>
-        </p:spPr>
-      </p:sp>
-      <p:sp>
-        <p:nvSpPr>
-          <p:cNvPr id="45" name="Shape 43"/>
-          <p:cNvSpPr/>
-          <p:nvPr/>
-        </p:nvSpPr>
-        <p:spPr>
-          <a:xfrm>
-            <a:off x="713232" y="3895344"/>
-            <a:ext cx="274320" cy="822960"/>
-          </a:xfrm>
-          <a:prstGeom prst="rect">
-            <a:avLst/>
-          </a:prstGeom>
-          <a:solidFill>
-            <a:srgbClr val="00FFD1">
-              <a:alpha val="18000"/>
-            </a:srgbClr>
-          </a:solidFill>
-          <a:ln w="12700">
-            <a:solidFill>
-              <a:srgbClr val="000000"/>
-            </a:solidFill>
-            <a:prstDash val="solid"/>
-          </a:ln>
-        </p:spPr>
-      </p:sp>
-      <p:sp>
-        <p:nvSpPr>
-          <p:cNvPr id="46" name="Text 44"/>
-          <p:cNvSpPr/>
-          <p:nvPr/>
-        </p:nvSpPr>
-        <p:spPr>
-          <a:xfrm>
-            <a:off x="274320" y="3895344"/>
-            <a:ext cx="713232" cy="822960"/>
-          </a:xfrm>
-          <a:prstGeom prst="rect">
-            <a:avLst/>
-          </a:prstGeom>
-          <a:noFill/>
-          <a:ln/>
-        </p:spPr>
-        <p:txBody>
-          <a:bodyPr wrap="square" lIns="0" tIns="0" rIns="0" bIns="0" rtlCol="0" anchor="ctr"/>
-          <a:lstStyle/>
-          <a:p>
-            <a:pPr algn="ctr" indent="0" marL="0">
-              <a:buNone/>
-            </a:pPr>
-            <a:r>
-              <a:rPr lang="en-US" sz="2200" dirty="0">
-                <a:solidFill>
-                  <a:srgbClr val="000000"/>
-                </a:solidFill>
-              </a:rPr>
-              <a:t>🎤</a:t>
-            </a:r>
-            <a:endParaRPr lang="en-US" sz="2200" dirty="0"/>
-          </a:p>
-        </p:txBody>
-      </p:sp>
-      <p:sp>
-        <p:nvSpPr>
-          <p:cNvPr id="47" name="Text 45"/>
-          <p:cNvSpPr/>
-          <p:nvPr/>
-        </p:nvSpPr>
-        <p:spPr>
-          <a:xfrm>
-            <a:off x="1078992" y="3968496"/>
-            <a:ext cx="1371600" cy="237744"/>
-          </a:xfrm>
-          <a:prstGeom prst="rect">
-            <a:avLst/>
-          </a:prstGeom>
-          <a:noFill/>
-          <a:ln/>
-        </p:spPr>
-        <p:txBody>
-          <a:bodyPr wrap="square" lIns="0" tIns="0" rIns="0" bIns="0" rtlCol="0" anchor="ctr"/>
-          <a:lstStyle/>
-          <a:p>
-            <a:pPr indent="0" marL="0">
-              <a:buNone/>
-            </a:pPr>
-            <a:r>
-              <a:rPr lang="en-US" sz="900" b="1" spc="100" kern="0" dirty="0">
-                <a:solidFill>
-                  <a:srgbClr val="00FFD1"/>
-                </a:solidFill>
-                <a:latin typeface="Consolas" pitchFamily="34" charset="0"/>
-                <a:ea typeface="Consolas" pitchFamily="34" charset="-122"/>
-                <a:cs typeface="Consolas" pitchFamily="34" charset="-120"/>
-              </a:rPr>
-              <a:t>VOICE + PWA</a:t>
-            </a:r>
-            <a:endParaRPr lang="en-US" sz="900" dirty="0"/>
-          </a:p>
-        </p:txBody>
-      </p:sp>
-      <p:sp>
-        <p:nvSpPr>
-          <p:cNvPr id="48" name="Text 46"/>
-          <p:cNvSpPr/>
-          <p:nvPr/>
-        </p:nvSpPr>
-        <p:spPr>
-          <a:xfrm>
-            <a:off x="1078992" y="4224528"/>
-            <a:ext cx="3401568" cy="420624"/>
-          </a:xfrm>
-          <a:prstGeom prst="rect">
-            <a:avLst/>
-          </a:prstGeom>
-          <a:noFill/>
-          <a:ln/>
-        </p:spPr>
-        <p:txBody>
-          <a:bodyPr wrap="square" lIns="0" tIns="0" rIns="0" bIns="0" rtlCol="0" anchor="ctr"/>
-          <a:lstStyle/>
-          <a:p>
-            <a:pPr indent="0" marL="0">
-              <a:buNone/>
-            </a:pPr>
-            <a:r>
-              <a:rPr lang="en-US" sz="920" dirty="0">
-                <a:solidFill>
-                  <a:srgbClr val="3D6080"/>
-                </a:solidFill>
-                <a:latin typeface="Calibri" pitchFamily="34" charset="0"/>
-                <a:ea typeface="Calibri" pitchFamily="34" charset="-122"/>
-                <a:cs typeface="Calibri" pitchFamily="34" charset="-120"/>
-              </a:rPr>
-              <a:t>Web Speech API  ·  Hindi hi-IN  ·  Web App Manifest  ·  Offline-ready</a:t>
+              <a:t>Mobile OTP  ·  Backend API Auth  ·  Any device login  ·  Role-based ✅</a:t>
             </a:r>
             <a:endParaRPr lang="en-US" sz="920" dirty="0"/>
           </a:p>
@@ -11849,7 +11849,7 @@
                 <a:ea typeface="Consolas" pitchFamily="34" charset="-122"/>
                 <a:cs typeface="Consolas" pitchFamily="34" charset="-120"/>
               </a:rPr>
-              <a:t>✅  Both URLs LIVE RIGHT NOW — civiceye-v6.vercel.app  ·  civiceye-v6.onrender.com  ·  FREE FOREVER</a:t>
+              <a:t>✅  Frontend (Vercel) + Backend (Render) + PostgreSQL DB — Sab LIVE · FREE FOREVER · Backend-Connected ✅</a:t>
             </a:r>
             <a:endParaRPr lang="en-US" sz="1000" dirty="0"/>
           </a:p>

</xml_diff>